<commit_message>
derivation of loglikelihood = expected value
</commit_message>
<xml_diff>
--- a/chapter02/Chapter02pptx.pptx
+++ b/chapter02/Chapter02pptx.pptx
@@ -7,6 +7,8 @@
   <p:sldIdLst>
     <p:sldId id="256" r:id="rId2"/>
     <p:sldId id="257" r:id="rId3"/>
+    <p:sldId id="258" r:id="rId4"/>
+    <p:sldId id="259" r:id="rId5"/>
   </p:sldIdLst>
   <p:sldSz cx="12192000" cy="6858000"/>
   <p:notesSz cx="6858000" cy="9144000"/>
@@ -3442,7 +3444,7 @@
         <p:spPr>
           <a:xfrm>
             <a:off x="2435087" y="1172817"/>
-            <a:ext cx="2330574" cy="923330"/>
+            <a:ext cx="2330574" cy="2585323"/>
           </a:xfrm>
           <a:prstGeom prst="rect">
             <a:avLst/>
@@ -3470,12 +3472,61 @@
               <a:t>B</a:t>
             </a:r>
             <a:r>
-              <a:rPr lang="en-CH"/>
+              <a:rPr lang="en-CH" dirty="0"/>
               <a:t>ayes theorem</a:t>
             </a:r>
           </a:p>
           <a:p>
-            <a:endParaRPr lang="en-CH"/>
+            <a:endParaRPr lang="en-CH" dirty="0"/>
+          </a:p>
+          <a:p>
+            <a:r>
+              <a:rPr lang="en-GB" dirty="0"/>
+              <a:t>R</a:t>
+            </a:r>
+            <a:r>
+              <a:rPr lang="en-CH" dirty="0"/>
+              <a:t>esiduals</a:t>
+            </a:r>
+          </a:p>
+          <a:p>
+            <a:endParaRPr lang="en-CH" dirty="0"/>
+          </a:p>
+          <a:p>
+            <a:r>
+              <a:rPr lang="en-GB" dirty="0"/>
+              <a:t>H</a:t>
+            </a:r>
+            <a:r>
+              <a:rPr lang="en-CH" dirty="0"/>
+              <a:t>at</a:t>
+            </a:r>
+          </a:p>
+          <a:p>
+            <a:r>
+              <a:rPr lang="en-CH" dirty="0"/>
+              <a:t>MLE</a:t>
+            </a:r>
+          </a:p>
+          <a:p>
+            <a:r>
+              <a:rPr lang="en-GB" dirty="0"/>
+              <a:t>L</a:t>
+            </a:r>
+            <a:r>
+              <a:rPr lang="en-CH" dirty="0"/>
+              <a:t>og rules</a:t>
+            </a:r>
+          </a:p>
+          <a:p>
+            <a:r>
+              <a:rPr lang="en-GB" dirty="0"/>
+              <a:t>D</a:t>
+            </a:r>
+            <a:r>
+              <a:rPr lang="en-CH" dirty="0"/>
+              <a:t>ifferentiation rules</a:t>
+            </a:r>
           </a:p>
         </p:txBody>
       </p:sp>
@@ -3483,6 +3534,265 @@
     <p:extLst>
       <p:ext uri="{BB962C8B-B14F-4D97-AF65-F5344CB8AC3E}">
         <p14:creationId xmlns:p14="http://schemas.microsoft.com/office/powerpoint/2010/main" val="508457898"/>
+      </p:ext>
+    </p:extLst>
+  </p:cSld>
+  <p:clrMapOvr>
+    <a:masterClrMapping/>
+  </p:clrMapOvr>
+</p:sld>
+</file>
+
+<file path=ppt/slides/slide3.xml><?xml version="1.0" encoding="utf-8"?>
+<p:sld xmlns:a="http://schemas.openxmlformats.org/drawingml/2006/main" xmlns:r="http://schemas.openxmlformats.org/officeDocument/2006/relationships" xmlns:p="http://schemas.openxmlformats.org/presentationml/2006/main">
+  <p:cSld>
+    <p:spTree>
+      <p:nvGrpSpPr>
+        <p:cNvPr id="1" name=""/>
+        <p:cNvGrpSpPr/>
+        <p:nvPr/>
+      </p:nvGrpSpPr>
+      <p:grpSpPr>
+        <a:xfrm>
+          <a:off x="0" y="0"/>
+          <a:ext cx="0" cy="0"/>
+          <a:chOff x="0" y="0"/>
+          <a:chExt cx="0" cy="0"/>
+        </a:xfrm>
+      </p:grpSpPr>
+      <p:pic>
+        <p:nvPicPr>
+          <p:cNvPr id="4" name="Picture 3">
+            <a:extLst>
+              <a:ext uri="{FF2B5EF4-FFF2-40B4-BE49-F238E27FC236}">
+                <a16:creationId xmlns:a16="http://schemas.microsoft.com/office/drawing/2014/main" id="{5AEFBD1C-2E37-604C-A66C-C33713025C9C}"/>
+              </a:ext>
+            </a:extLst>
+          </p:cNvPr>
+          <p:cNvPicPr>
+            <a:picLocks noChangeAspect="1"/>
+          </p:cNvPicPr>
+          <p:nvPr/>
+        </p:nvPicPr>
+        <p:blipFill>
+          <a:blip r:embed="rId2"/>
+          <a:stretch>
+            <a:fillRect/>
+          </a:stretch>
+        </p:blipFill>
+        <p:spPr>
+          <a:xfrm>
+            <a:off x="2538888" y="928377"/>
+            <a:ext cx="6827534" cy="4458601"/>
+          </a:xfrm>
+          <a:prstGeom prst="rect">
+            <a:avLst/>
+          </a:prstGeom>
+        </p:spPr>
+      </p:pic>
+      <p:sp>
+        <p:nvSpPr>
+          <p:cNvPr id="9" name="TextBox 8">
+            <a:extLst>
+              <a:ext uri="{FF2B5EF4-FFF2-40B4-BE49-F238E27FC236}">
+                <a16:creationId xmlns:a16="http://schemas.microsoft.com/office/drawing/2014/main" id="{606741E3-A0B4-7A43-9871-C658108E4F04}"/>
+              </a:ext>
+            </a:extLst>
+          </p:cNvPr>
+          <p:cNvSpPr txBox="1"/>
+          <p:nvPr/>
+        </p:nvSpPr>
+        <p:spPr>
+          <a:xfrm>
+            <a:off x="827903" y="345989"/>
+            <a:ext cx="7176580" cy="369332"/>
+          </a:xfrm>
+          <a:prstGeom prst="rect">
+            <a:avLst/>
+          </a:prstGeom>
+          <a:noFill/>
+        </p:spPr>
+        <p:txBody>
+          <a:bodyPr wrap="none" rtlCol="0">
+            <a:spAutoFit/>
+          </a:bodyPr>
+          <a:lstStyle/>
+          <a:p>
+            <a:r>
+              <a:rPr lang="en-CH" b="1" dirty="0"/>
+              <a:t>Proof that the mean of the Poisson distribution maximises the likelihood:</a:t>
+            </a:r>
+          </a:p>
+        </p:txBody>
+      </p:sp>
+      <p:sp>
+        <p:nvSpPr>
+          <p:cNvPr id="10" name="TextBox 9">
+            <a:extLst>
+              <a:ext uri="{FF2B5EF4-FFF2-40B4-BE49-F238E27FC236}">
+                <a16:creationId xmlns:a16="http://schemas.microsoft.com/office/drawing/2014/main" id="{D921AA62-A811-0F47-922A-0A6292E0C9AE}"/>
+              </a:ext>
+            </a:extLst>
+          </p:cNvPr>
+          <p:cNvSpPr txBox="1"/>
+          <p:nvPr/>
+        </p:nvSpPr>
+        <p:spPr>
+          <a:xfrm>
+            <a:off x="3954162" y="6153665"/>
+            <a:ext cx="5159682" cy="369332"/>
+          </a:xfrm>
+          <a:prstGeom prst="rect">
+            <a:avLst/>
+          </a:prstGeom>
+          <a:noFill/>
+        </p:spPr>
+        <p:txBody>
+          <a:bodyPr wrap="none" rtlCol="0">
+            <a:spAutoFit/>
+          </a:bodyPr>
+          <a:lstStyle/>
+          <a:p>
+            <a:r>
+              <a:rPr lang="en-GB" dirty="0"/>
+              <a:t>…. A</a:t>
+            </a:r>
+            <a:r>
+              <a:rPr lang="en-CH" dirty="0"/>
+              <a:t> more detailed working out is on the next slide….</a:t>
+            </a:r>
+          </a:p>
+        </p:txBody>
+      </p:sp>
+    </p:spTree>
+    <p:extLst>
+      <p:ext uri="{BB962C8B-B14F-4D97-AF65-F5344CB8AC3E}">
+        <p14:creationId xmlns:p14="http://schemas.microsoft.com/office/powerpoint/2010/main" val="3922666418"/>
+      </p:ext>
+    </p:extLst>
+  </p:cSld>
+  <p:clrMapOvr>
+    <a:masterClrMapping/>
+  </p:clrMapOvr>
+</p:sld>
+</file>
+
+<file path=ppt/slides/slide4.xml><?xml version="1.0" encoding="utf-8"?>
+<p:sld xmlns:a="http://schemas.openxmlformats.org/drawingml/2006/main" xmlns:r="http://schemas.openxmlformats.org/officeDocument/2006/relationships" xmlns:p="http://schemas.openxmlformats.org/presentationml/2006/main">
+  <p:cSld>
+    <p:spTree>
+      <p:nvGrpSpPr>
+        <p:cNvPr id="1" name=""/>
+        <p:cNvGrpSpPr/>
+        <p:nvPr/>
+      </p:nvGrpSpPr>
+      <p:grpSpPr>
+        <a:xfrm>
+          <a:off x="0" y="0"/>
+          <a:ext cx="0" cy="0"/>
+          <a:chOff x="0" y="0"/>
+          <a:chExt cx="0" cy="0"/>
+        </a:xfrm>
+      </p:grpSpPr>
+      <p:sp>
+        <p:nvSpPr>
+          <p:cNvPr id="9" name="TextBox 8">
+            <a:extLst>
+              <a:ext uri="{FF2B5EF4-FFF2-40B4-BE49-F238E27FC236}">
+                <a16:creationId xmlns:a16="http://schemas.microsoft.com/office/drawing/2014/main" id="{606741E3-A0B4-7A43-9871-C658108E4F04}"/>
+              </a:ext>
+            </a:extLst>
+          </p:cNvPr>
+          <p:cNvSpPr txBox="1"/>
+          <p:nvPr/>
+        </p:nvSpPr>
+        <p:spPr>
+          <a:xfrm>
+            <a:off x="827903" y="345989"/>
+            <a:ext cx="7176580" cy="369332"/>
+          </a:xfrm>
+          <a:prstGeom prst="rect">
+            <a:avLst/>
+          </a:prstGeom>
+          <a:noFill/>
+        </p:spPr>
+        <p:txBody>
+          <a:bodyPr wrap="none" rtlCol="0">
+            <a:spAutoFit/>
+          </a:bodyPr>
+          <a:lstStyle/>
+          <a:p>
+            <a:r>
+              <a:rPr lang="en-CH" b="1" dirty="0"/>
+              <a:t>Proof that the mean of the Poisson distribution maximises the likelihood:</a:t>
+            </a:r>
+          </a:p>
+        </p:txBody>
+      </p:sp>
+      <p:pic>
+        <p:nvPicPr>
+          <p:cNvPr id="14" name="Picture 13">
+            <a:extLst>
+              <a:ext uri="{FF2B5EF4-FFF2-40B4-BE49-F238E27FC236}">
+                <a16:creationId xmlns:a16="http://schemas.microsoft.com/office/drawing/2014/main" id="{E29A71AF-207C-8247-82EB-1780E86A3D7E}"/>
+              </a:ext>
+            </a:extLst>
+          </p:cNvPr>
+          <p:cNvPicPr>
+            <a:picLocks noChangeAspect="1"/>
+          </p:cNvPicPr>
+          <p:nvPr/>
+        </p:nvPicPr>
+        <p:blipFill>
+          <a:blip r:embed="rId2"/>
+          <a:stretch>
+            <a:fillRect/>
+          </a:stretch>
+        </p:blipFill>
+        <p:spPr>
+          <a:xfrm>
+            <a:off x="827903" y="895865"/>
+            <a:ext cx="4901257" cy="5962135"/>
+          </a:xfrm>
+          <a:prstGeom prst="rect">
+            <a:avLst/>
+          </a:prstGeom>
+        </p:spPr>
+      </p:pic>
+      <p:pic>
+        <p:nvPicPr>
+          <p:cNvPr id="15" name="Picture 14">
+            <a:extLst>
+              <a:ext uri="{FF2B5EF4-FFF2-40B4-BE49-F238E27FC236}">
+                <a16:creationId xmlns:a16="http://schemas.microsoft.com/office/drawing/2014/main" id="{15B0F811-4B40-0441-88E8-7CB6D4AA895B}"/>
+              </a:ext>
+            </a:extLst>
+          </p:cNvPr>
+          <p:cNvPicPr>
+            <a:picLocks noChangeAspect="1"/>
+          </p:cNvPicPr>
+          <p:nvPr/>
+        </p:nvPicPr>
+        <p:blipFill>
+          <a:blip r:embed="rId3"/>
+          <a:stretch>
+            <a:fillRect/>
+          </a:stretch>
+        </p:blipFill>
+        <p:spPr>
+          <a:xfrm>
+            <a:off x="6575600" y="895865"/>
+            <a:ext cx="4924167" cy="4924167"/>
+          </a:xfrm>
+          <a:prstGeom prst="rect">
+            <a:avLst/>
+          </a:prstGeom>
+        </p:spPr>
+      </p:pic>
+    </p:spTree>
+    <p:extLst>
+      <p:ext uri="{BB962C8B-B14F-4D97-AF65-F5344CB8AC3E}">
+        <p14:creationId xmlns:p14="http://schemas.microsoft.com/office/powerpoint/2010/main" val="1134133447"/>
       </p:ext>
     </p:extLst>
   </p:cSld>

</xml_diff>